<commit_message>
reference update, numbers placed, figures updated
</commit_message>
<xml_diff>
--- a/figures/inter_gpu_connections.pptx
+++ b/figures/inter_gpu_connections.pptx
@@ -288,7 +288,7 @@
           <a:p>
             <a:fld id="{DF0FAB3D-4F44-4284-A2F4-9F94FAC0A17E}" type="datetimeFigureOut">
               <a:rPr lang="en-US" smtClean="0"/>
-              <a:t>4/3/2017</a:t>
+              <a:t>4/4/2017</a:t>
             </a:fld>
             <a:endParaRPr lang="en-US"/>
           </a:p>
@@ -458,7 +458,7 @@
           <a:p>
             <a:fld id="{DF0FAB3D-4F44-4284-A2F4-9F94FAC0A17E}" type="datetimeFigureOut">
               <a:rPr lang="en-US" smtClean="0"/>
-              <a:t>4/3/2017</a:t>
+              <a:t>4/4/2017</a:t>
             </a:fld>
             <a:endParaRPr lang="en-US"/>
           </a:p>
@@ -638,7 +638,7 @@
           <a:p>
             <a:fld id="{DF0FAB3D-4F44-4284-A2F4-9F94FAC0A17E}" type="datetimeFigureOut">
               <a:rPr lang="en-US" smtClean="0"/>
-              <a:t>4/3/2017</a:t>
+              <a:t>4/4/2017</a:t>
             </a:fld>
             <a:endParaRPr lang="en-US"/>
           </a:p>
@@ -808,7 +808,7 @@
           <a:p>
             <a:fld id="{DF0FAB3D-4F44-4284-A2F4-9F94FAC0A17E}" type="datetimeFigureOut">
               <a:rPr lang="en-US" smtClean="0"/>
-              <a:t>4/3/2017</a:t>
+              <a:t>4/4/2017</a:t>
             </a:fld>
             <a:endParaRPr lang="en-US"/>
           </a:p>
@@ -1054,7 +1054,7 @@
           <a:p>
             <a:fld id="{DF0FAB3D-4F44-4284-A2F4-9F94FAC0A17E}" type="datetimeFigureOut">
               <a:rPr lang="en-US" smtClean="0"/>
-              <a:t>4/3/2017</a:t>
+              <a:t>4/4/2017</a:t>
             </a:fld>
             <a:endParaRPr lang="en-US"/>
           </a:p>
@@ -1342,7 +1342,7 @@
           <a:p>
             <a:fld id="{DF0FAB3D-4F44-4284-A2F4-9F94FAC0A17E}" type="datetimeFigureOut">
               <a:rPr lang="en-US" smtClean="0"/>
-              <a:t>4/3/2017</a:t>
+              <a:t>4/4/2017</a:t>
             </a:fld>
             <a:endParaRPr lang="en-US"/>
           </a:p>
@@ -1764,7 +1764,7 @@
           <a:p>
             <a:fld id="{DF0FAB3D-4F44-4284-A2F4-9F94FAC0A17E}" type="datetimeFigureOut">
               <a:rPr lang="en-US" smtClean="0"/>
-              <a:t>4/3/2017</a:t>
+              <a:t>4/4/2017</a:t>
             </a:fld>
             <a:endParaRPr lang="en-US"/>
           </a:p>
@@ -1882,7 +1882,7 @@
           <a:p>
             <a:fld id="{DF0FAB3D-4F44-4284-A2F4-9F94FAC0A17E}" type="datetimeFigureOut">
               <a:rPr lang="en-US" smtClean="0"/>
-              <a:t>4/3/2017</a:t>
+              <a:t>4/4/2017</a:t>
             </a:fld>
             <a:endParaRPr lang="en-US"/>
           </a:p>
@@ -1977,7 +1977,7 @@
           <a:p>
             <a:fld id="{DF0FAB3D-4F44-4284-A2F4-9F94FAC0A17E}" type="datetimeFigureOut">
               <a:rPr lang="en-US" smtClean="0"/>
-              <a:t>4/3/2017</a:t>
+              <a:t>4/4/2017</a:t>
             </a:fld>
             <a:endParaRPr lang="en-US"/>
           </a:p>
@@ -2254,7 +2254,7 @@
           <a:p>
             <a:fld id="{DF0FAB3D-4F44-4284-A2F4-9F94FAC0A17E}" type="datetimeFigureOut">
               <a:rPr lang="en-US" smtClean="0"/>
-              <a:t>4/3/2017</a:t>
+              <a:t>4/4/2017</a:t>
             </a:fld>
             <a:endParaRPr lang="en-US"/>
           </a:p>
@@ -2507,7 +2507,7 @@
           <a:p>
             <a:fld id="{DF0FAB3D-4F44-4284-A2F4-9F94FAC0A17E}" type="datetimeFigureOut">
               <a:rPr lang="en-US" smtClean="0"/>
-              <a:t>4/3/2017</a:t>
+              <a:t>4/4/2017</a:t>
             </a:fld>
             <a:endParaRPr lang="en-US"/>
           </a:p>
@@ -2720,7 +2720,7 @@
           <a:p>
             <a:fld id="{DF0FAB3D-4F44-4284-A2F4-9F94FAC0A17E}" type="datetimeFigureOut">
               <a:rPr lang="en-US" smtClean="0"/>
-              <a:t>4/3/2017</a:t>
+              <a:t>4/4/2017</a:t>
             </a:fld>
             <a:endParaRPr lang="en-US"/>
           </a:p>
@@ -3109,6 +3109,11 @@
           <a:prstGeom prst="rect">
             <a:avLst/>
           </a:prstGeom>
+          <a:solidFill>
+            <a:schemeClr val="bg1">
+              <a:lumMod val="85000"/>
+            </a:schemeClr>
+          </a:solidFill>
         </p:spPr>
         <p:style>
           <a:lnRef idx="1">
@@ -3185,6 +3190,11 @@
           <a:prstGeom prst="rect">
             <a:avLst/>
           </a:prstGeom>
+          <a:solidFill>
+            <a:schemeClr val="bg1">
+              <a:lumMod val="85000"/>
+            </a:schemeClr>
+          </a:solidFill>
         </p:spPr>
         <p:style>
           <a:lnRef idx="1">
@@ -3695,15 +3705,15 @@
           </a:fontRef>
         </p:style>
         <p:txBody>
-          <a:bodyPr rtlCol="0" anchor="ctr"/>
+          <a:bodyPr lIns="0" tIns="0" rIns="0" bIns="0" rtlCol="0" anchor="ctr"/>
           <a:lstStyle/>
           <a:p>
             <a:pPr algn="ctr"/>
             <a:r>
-              <a:rPr lang="en-US" b="1" dirty="0" smtClean="0"/>
+              <a:rPr lang="en-US" sz="2000" b="1" dirty="0" smtClean="0"/>
               <a:t>GPU</a:t>
             </a:r>
-            <a:endParaRPr lang="en-US" b="1" dirty="0"/>
+            <a:endParaRPr lang="en-US" sz="2000" b="1" dirty="0"/>
           </a:p>
         </p:txBody>
       </p:sp>
@@ -3737,19 +3747,19 @@
           </a:fontRef>
         </p:style>
         <p:txBody>
-          <a:bodyPr rtlCol="0" anchor="ctr"/>
+          <a:bodyPr lIns="0" tIns="0" rIns="0" bIns="0" rtlCol="0" anchor="ctr"/>
           <a:lstStyle/>
           <a:p>
             <a:pPr algn="ctr"/>
             <a:r>
-              <a:rPr lang="en-US" b="1" dirty="0"/>
+              <a:rPr lang="en-US" sz="2000" b="1" dirty="0"/>
               <a:t>C</a:t>
             </a:r>
             <a:r>
-              <a:rPr lang="en-US" b="1" dirty="0" smtClean="0"/>
+              <a:rPr lang="en-US" sz="2000" b="1" dirty="0" smtClean="0"/>
               <a:t>PU</a:t>
             </a:r>
-            <a:endParaRPr lang="en-US" b="1" dirty="0"/>
+            <a:endParaRPr lang="en-US" sz="2000" b="1" dirty="0"/>
           </a:p>
         </p:txBody>
       </p:sp>
@@ -4023,15 +4033,15 @@
           </a:fontRef>
         </p:style>
         <p:txBody>
-          <a:bodyPr rtlCol="0" anchor="ctr"/>
+          <a:bodyPr lIns="0" tIns="0" rIns="0" bIns="0" rtlCol="0" anchor="ctr"/>
           <a:lstStyle/>
           <a:p>
             <a:pPr algn="ctr"/>
             <a:r>
-              <a:rPr lang="en-US" b="1" dirty="0" smtClean="0"/>
+              <a:rPr lang="en-US" sz="2000" b="1" dirty="0" smtClean="0"/>
               <a:t>GPU</a:t>
             </a:r>
-            <a:endParaRPr lang="en-US" b="1" dirty="0"/>
+            <a:endParaRPr lang="en-US" sz="2000" b="1" dirty="0"/>
           </a:p>
         </p:txBody>
       </p:sp>
@@ -4065,15 +4075,15 @@
           </a:fontRef>
         </p:style>
         <p:txBody>
-          <a:bodyPr rtlCol="0" anchor="ctr"/>
+          <a:bodyPr lIns="0" tIns="0" rIns="0" bIns="0" rtlCol="0" anchor="ctr"/>
           <a:lstStyle/>
           <a:p>
             <a:pPr algn="ctr"/>
             <a:r>
-              <a:rPr lang="en-US" b="1" dirty="0" smtClean="0"/>
+              <a:rPr lang="en-US" sz="2000" b="1" dirty="0" smtClean="0"/>
               <a:t>GPU</a:t>
             </a:r>
-            <a:endParaRPr lang="en-US" b="1" dirty="0"/>
+            <a:endParaRPr lang="en-US" sz="2000" b="1" dirty="0"/>
           </a:p>
         </p:txBody>
       </p:sp>
@@ -4107,15 +4117,15 @@
           </a:fontRef>
         </p:style>
         <p:txBody>
-          <a:bodyPr rtlCol="0" anchor="ctr"/>
+          <a:bodyPr lIns="0" tIns="0" rIns="0" bIns="0" rtlCol="0" anchor="ctr"/>
           <a:lstStyle/>
           <a:p>
             <a:pPr algn="ctr"/>
             <a:r>
-              <a:rPr lang="en-US" b="1" dirty="0" smtClean="0"/>
+              <a:rPr lang="en-US" sz="2000" b="1" dirty="0" smtClean="0"/>
               <a:t>GPU</a:t>
             </a:r>
-            <a:endParaRPr lang="en-US" b="1" dirty="0"/>
+            <a:endParaRPr lang="en-US" sz="2000" b="1" dirty="0"/>
           </a:p>
         </p:txBody>
       </p:sp>
@@ -4197,15 +4207,15 @@
           </a:fontRef>
         </p:style>
         <p:txBody>
-          <a:bodyPr rtlCol="0" anchor="ctr"/>
+          <a:bodyPr lIns="0" tIns="0" rIns="0" bIns="0" rtlCol="0" anchor="ctr"/>
           <a:lstStyle/>
           <a:p>
             <a:pPr algn="ctr"/>
             <a:r>
-              <a:rPr lang="en-US" b="1" dirty="0" smtClean="0"/>
+              <a:rPr lang="en-US" sz="2000" b="1" dirty="0" smtClean="0"/>
               <a:t>GPU</a:t>
             </a:r>
-            <a:endParaRPr lang="en-US" b="1" dirty="0"/>
+            <a:endParaRPr lang="en-US" sz="2000" b="1" dirty="0"/>
           </a:p>
         </p:txBody>
       </p:sp>
@@ -4239,15 +4249,15 @@
           </a:fontRef>
         </p:style>
         <p:txBody>
-          <a:bodyPr rtlCol="0" anchor="ctr"/>
+          <a:bodyPr lIns="0" tIns="0" rIns="0" bIns="0" rtlCol="0" anchor="ctr"/>
           <a:lstStyle/>
           <a:p>
             <a:pPr algn="ctr"/>
             <a:r>
-              <a:rPr lang="en-US" b="1" dirty="0" smtClean="0"/>
+              <a:rPr lang="en-US" sz="2000" b="1" dirty="0" smtClean="0"/>
               <a:t>GPU</a:t>
             </a:r>
-            <a:endParaRPr lang="en-US" b="1" dirty="0"/>
+            <a:endParaRPr lang="en-US" sz="2000" b="1" dirty="0"/>
           </a:p>
         </p:txBody>
       </p:sp>
@@ -4281,15 +4291,15 @@
           </a:fontRef>
         </p:style>
         <p:txBody>
-          <a:bodyPr rtlCol="0" anchor="ctr"/>
+          <a:bodyPr lIns="0" tIns="0" rIns="0" bIns="0" rtlCol="0" anchor="ctr"/>
           <a:lstStyle/>
           <a:p>
             <a:pPr algn="ctr"/>
             <a:r>
-              <a:rPr lang="en-US" b="1" dirty="0" smtClean="0"/>
+              <a:rPr lang="en-US" sz="2000" b="1" dirty="0" smtClean="0"/>
               <a:t>GPU</a:t>
             </a:r>
-            <a:endParaRPr lang="en-US" b="1" dirty="0"/>
+            <a:endParaRPr lang="en-US" sz="2000" b="1" dirty="0"/>
           </a:p>
         </p:txBody>
       </p:sp>
@@ -4323,15 +4333,15 @@
           </a:fontRef>
         </p:style>
         <p:txBody>
-          <a:bodyPr rtlCol="0" anchor="ctr"/>
+          <a:bodyPr lIns="0" tIns="0" rIns="0" bIns="0" rtlCol="0" anchor="ctr"/>
           <a:lstStyle/>
           <a:p>
             <a:pPr algn="ctr"/>
             <a:r>
-              <a:rPr lang="en-US" b="1" dirty="0" smtClean="0"/>
+              <a:rPr lang="en-US" sz="2000" b="1" dirty="0" smtClean="0"/>
               <a:t>GPU</a:t>
             </a:r>
-            <a:endParaRPr lang="en-US" b="1" dirty="0"/>
+            <a:endParaRPr lang="en-US" sz="2000" b="1" dirty="0"/>
           </a:p>
         </p:txBody>
       </p:sp>
@@ -4365,19 +4375,19 @@
           </a:fontRef>
         </p:style>
         <p:txBody>
-          <a:bodyPr rtlCol="0" anchor="ctr"/>
+          <a:bodyPr lIns="0" tIns="0" rIns="0" bIns="0" rtlCol="0" anchor="ctr"/>
           <a:lstStyle/>
           <a:p>
             <a:pPr algn="ctr"/>
             <a:r>
-              <a:rPr lang="en-US" b="1" dirty="0"/>
+              <a:rPr lang="en-US" sz="2000" b="1" dirty="0"/>
               <a:t>C</a:t>
             </a:r>
             <a:r>
-              <a:rPr lang="en-US" b="1" dirty="0" smtClean="0"/>
+              <a:rPr lang="en-US" sz="2000" b="1" dirty="0" smtClean="0"/>
               <a:t>PU</a:t>
             </a:r>
-            <a:endParaRPr lang="en-US" b="1" dirty="0"/>
+            <a:endParaRPr lang="en-US" sz="2000" b="1" dirty="0"/>
           </a:p>
         </p:txBody>
       </p:sp>
@@ -4644,7 +4654,7 @@
           </a:prstGeom>
           <a:ln w="44450">
             <a:solidFill>
-              <a:srgbClr val="92D050"/>
+              <a:srgbClr val="00B050"/>
             </a:solidFill>
             <a:headEnd type="triangle"/>
             <a:tailEnd type="triangle"/>
@@ -4684,7 +4694,7 @@
           </a:prstGeom>
           <a:ln w="44450">
             <a:solidFill>
-              <a:srgbClr val="92D050"/>
+              <a:srgbClr val="00B050"/>
             </a:solidFill>
             <a:headEnd type="triangle"/>
             <a:tailEnd type="triangle"/>
@@ -4721,7 +4731,7 @@
           </a:prstGeom>
           <a:ln w="44450">
             <a:solidFill>
-              <a:srgbClr val="92D050"/>
+              <a:srgbClr val="00B050"/>
             </a:solidFill>
             <a:headEnd type="triangle"/>
             <a:tailEnd type="triangle"/>
@@ -4758,7 +4768,7 @@
           </a:prstGeom>
           <a:ln w="44450">
             <a:solidFill>
-              <a:srgbClr val="92D050"/>
+              <a:srgbClr val="00B050"/>
             </a:solidFill>
             <a:headEnd type="triangle"/>
             <a:tailEnd type="triangle"/>
@@ -4795,7 +4805,7 @@
           </a:prstGeom>
           <a:ln w="44450">
             <a:solidFill>
-              <a:srgbClr val="92D050"/>
+              <a:srgbClr val="00B050"/>
             </a:solidFill>
             <a:headEnd type="triangle"/>
             <a:tailEnd type="triangle"/>
@@ -4832,7 +4842,7 @@
           </a:prstGeom>
           <a:ln w="44450">
             <a:solidFill>
-              <a:srgbClr val="92D050"/>
+              <a:srgbClr val="00B050"/>
             </a:solidFill>
             <a:headEnd type="triangle"/>
             <a:tailEnd type="triangle"/>
@@ -4861,7 +4871,7 @@
         </p:nvSpPr>
         <p:spPr>
           <a:xfrm>
-            <a:off x="7391400" y="171450"/>
+            <a:off x="7386636" y="201159"/>
             <a:ext cx="685800" cy="742950"/>
           </a:xfrm>
           <a:prstGeom prst="roundRect">
@@ -4883,15 +4893,15 @@
           </a:fontRef>
         </p:style>
         <p:txBody>
-          <a:bodyPr rtlCol="0" anchor="ctr"/>
+          <a:bodyPr lIns="0" tIns="0" rIns="0" bIns="0" rtlCol="0" anchor="ctr"/>
           <a:lstStyle/>
           <a:p>
             <a:pPr algn="ctr"/>
             <a:r>
-              <a:rPr lang="en-US" b="1" dirty="0" smtClean="0"/>
+              <a:rPr lang="en-US" sz="2000" b="1" dirty="0" smtClean="0"/>
               <a:t>GPU</a:t>
             </a:r>
-            <a:endParaRPr lang="en-US" b="1" dirty="0"/>
+            <a:endParaRPr lang="en-US" sz="2000" b="1" dirty="0"/>
           </a:p>
         </p:txBody>
       </p:sp>
@@ -4925,19 +4935,19 @@
           </a:fontRef>
         </p:style>
         <p:txBody>
-          <a:bodyPr rtlCol="0" anchor="ctr"/>
+          <a:bodyPr lIns="0" tIns="0" rIns="0" bIns="0" rtlCol="0" anchor="ctr"/>
           <a:lstStyle/>
           <a:p>
             <a:pPr algn="ctr"/>
             <a:r>
-              <a:rPr lang="en-US" b="1" dirty="0"/>
+              <a:rPr lang="en-US" sz="2000" b="1" dirty="0"/>
               <a:t>C</a:t>
             </a:r>
             <a:r>
-              <a:rPr lang="en-US" b="1" dirty="0" smtClean="0"/>
+              <a:rPr lang="en-US" sz="2000" b="1" dirty="0" smtClean="0"/>
               <a:t>PU</a:t>
             </a:r>
-            <a:endParaRPr lang="en-US" b="1" dirty="0"/>
+            <a:endParaRPr lang="en-US" sz="2000" b="1" dirty="0"/>
           </a:p>
         </p:txBody>
       </p:sp>
@@ -4971,15 +4981,15 @@
           </a:fontRef>
         </p:style>
         <p:txBody>
-          <a:bodyPr rtlCol="0" anchor="ctr"/>
+          <a:bodyPr lIns="0" tIns="0" rIns="0" bIns="0" rtlCol="0" anchor="ctr"/>
           <a:lstStyle/>
           <a:p>
             <a:pPr algn="ctr"/>
             <a:r>
-              <a:rPr lang="en-US" b="1" dirty="0" smtClean="0"/>
+              <a:rPr lang="en-US" sz="2000" b="1" dirty="0" smtClean="0"/>
               <a:t>GPU</a:t>
             </a:r>
-            <a:endParaRPr lang="en-US" b="1" dirty="0"/>
+            <a:endParaRPr lang="en-US" sz="2000" b="1" dirty="0"/>
           </a:p>
         </p:txBody>
       </p:sp>
@@ -5013,15 +5023,15 @@
           </a:fontRef>
         </p:style>
         <p:txBody>
-          <a:bodyPr rtlCol="0" anchor="ctr"/>
+          <a:bodyPr lIns="0" tIns="0" rIns="0" bIns="0" rtlCol="0" anchor="ctr"/>
           <a:lstStyle/>
           <a:p>
             <a:pPr algn="ctr"/>
             <a:r>
-              <a:rPr lang="en-US" b="1" dirty="0" smtClean="0"/>
+              <a:rPr lang="en-US" sz="2000" b="1" dirty="0" smtClean="0"/>
               <a:t>GPU</a:t>
             </a:r>
-            <a:endParaRPr lang="en-US" b="1" dirty="0"/>
+            <a:endParaRPr lang="en-US" sz="2000" b="1" dirty="0"/>
           </a:p>
         </p:txBody>
       </p:sp>
@@ -5055,15 +5065,15 @@
           </a:fontRef>
         </p:style>
         <p:txBody>
-          <a:bodyPr rtlCol="0" anchor="ctr"/>
+          <a:bodyPr lIns="0" tIns="0" rIns="0" bIns="0" rtlCol="0" anchor="ctr"/>
           <a:lstStyle/>
           <a:p>
             <a:pPr algn="ctr"/>
             <a:r>
-              <a:rPr lang="en-US" b="1" dirty="0" smtClean="0"/>
+              <a:rPr lang="en-US" sz="2000" b="1" dirty="0" smtClean="0"/>
               <a:t>GPU</a:t>
             </a:r>
-            <a:endParaRPr lang="en-US" b="1" dirty="0"/>
+            <a:endParaRPr lang="en-US" sz="2000" b="1" dirty="0"/>
           </a:p>
         </p:txBody>
       </p:sp>
@@ -5085,7 +5095,7 @@
           </a:prstGeom>
           <a:ln w="63500">
             <a:solidFill>
-              <a:srgbClr val="92D050"/>
+              <a:srgbClr val="00B050"/>
             </a:solidFill>
             <a:headEnd type="triangle"/>
             <a:tailEnd type="triangle"/>
@@ -5116,7 +5126,7 @@
         </p:nvCxnSpPr>
         <p:spPr>
           <a:xfrm>
-            <a:off x="8077200" y="542925"/>
+            <a:off x="8072436" y="572634"/>
             <a:ext cx="494311" cy="1914525"/>
           </a:xfrm>
           <a:prstGeom prst="bentConnector2">
@@ -5124,7 +5134,7 @@
           </a:prstGeom>
           <a:ln w="63500">
             <a:solidFill>
-              <a:srgbClr val="92D050"/>
+              <a:srgbClr val="00B050"/>
             </a:solidFill>
             <a:headEnd type="triangle"/>
             <a:tailEnd type="triangle"/>
@@ -5163,7 +5173,7 @@
           </a:prstGeom>
           <a:ln w="63500">
             <a:solidFill>
-              <a:srgbClr val="92D050"/>
+              <a:srgbClr val="00B050"/>
             </a:solidFill>
             <a:headEnd type="triangle"/>
             <a:tailEnd type="triangle"/>
@@ -5202,7 +5212,7 @@
           </a:prstGeom>
           <a:ln w="63500">
             <a:solidFill>
-              <a:srgbClr val="92D050"/>
+              <a:srgbClr val="00B050"/>
             </a:solidFill>
             <a:headEnd type="triangle"/>
             <a:tailEnd type="triangle"/>
@@ -5295,7 +5305,7 @@
           </a:prstGeom>
           <a:ln w="63500">
             <a:solidFill>
-              <a:srgbClr val="92D050"/>
+              <a:srgbClr val="00B050"/>
             </a:solidFill>
             <a:headEnd type="triangle"/>
             <a:tailEnd type="triangle"/>
@@ -5552,7 +5562,7 @@
           </a:prstGeom>
           <a:ln w="44450">
             <a:solidFill>
-              <a:srgbClr val="92D050"/>
+              <a:srgbClr val="00B050"/>
             </a:solidFill>
             <a:headEnd type="triangle"/>
             <a:tailEnd type="triangle"/>
@@ -5589,7 +5599,7 @@
           </a:prstGeom>
           <a:ln w="44450">
             <a:solidFill>
-              <a:srgbClr val="92D050"/>
+              <a:srgbClr val="00B050"/>
             </a:solidFill>
             <a:headEnd type="triangle"/>
             <a:tailEnd type="triangle"/>
@@ -5697,7 +5707,7 @@
           </a:prstGeom>
           <a:ln w="50800">
             <a:solidFill>
-              <a:srgbClr val="92D050"/>
+              <a:srgbClr val="00B050"/>
             </a:solidFill>
             <a:headEnd type="triangle"/>
             <a:tailEnd type="triangle"/>
@@ -5804,6 +5814,11 @@
           <a:prstGeom prst="rect">
             <a:avLst/>
           </a:prstGeom>
+          <a:solidFill>
+            <a:schemeClr val="bg1">
+              <a:lumMod val="85000"/>
+            </a:schemeClr>
+          </a:solidFill>
         </p:spPr>
         <p:style>
           <a:lnRef idx="1">

</xml_diff>

<commit_message>
couple minor more fixes
</commit_message>
<xml_diff>
--- a/figures/inter_gpu_connections.pptx
+++ b/figures/inter_gpu_connections.pptx
@@ -1638,441 +1638,7 @@
                 </a:uFill>
                 <a:latin typeface="Calibri"/>
               </a:rPr>
-              <a:t>C</a:t>
-            </a:r>
-            <a:r>
-              <a:rPr b="0" lang="en-US" sz="4400" spc="-1" strike="noStrike">
-                <a:solidFill>
-                  <a:srgbClr val="000000"/>
-                </a:solidFill>
-                <a:uFill>
-                  <a:solidFill>
-                    <a:srgbClr val="ffffff"/>
-                  </a:solidFill>
-                </a:uFill>
-                <a:latin typeface="Calibri"/>
-              </a:rPr>
-              <a:t>l</a:t>
-            </a:r>
-            <a:r>
-              <a:rPr b="0" lang="en-US" sz="4400" spc="-1" strike="noStrike">
-                <a:solidFill>
-                  <a:srgbClr val="000000"/>
-                </a:solidFill>
-                <a:uFill>
-                  <a:solidFill>
-                    <a:srgbClr val="ffffff"/>
-                  </a:solidFill>
-                </a:uFill>
-                <a:latin typeface="Calibri"/>
-              </a:rPr>
-              <a:t>i</a:t>
-            </a:r>
-            <a:r>
-              <a:rPr b="0" lang="en-US" sz="4400" spc="-1" strike="noStrike">
-                <a:solidFill>
-                  <a:srgbClr val="000000"/>
-                </a:solidFill>
-                <a:uFill>
-                  <a:solidFill>
-                    <a:srgbClr val="ffffff"/>
-                  </a:solidFill>
-                </a:uFill>
-                <a:latin typeface="Calibri"/>
-              </a:rPr>
-              <a:t>c</a:t>
-            </a:r>
-            <a:r>
-              <a:rPr b="0" lang="en-US" sz="4400" spc="-1" strike="noStrike">
-                <a:solidFill>
-                  <a:srgbClr val="000000"/>
-                </a:solidFill>
-                <a:uFill>
-                  <a:solidFill>
-                    <a:srgbClr val="ffffff"/>
-                  </a:solidFill>
-                </a:uFill>
-                <a:latin typeface="Calibri"/>
-              </a:rPr>
-              <a:t>k</a:t>
-            </a:r>
-            <a:r>
-              <a:rPr b="0" lang="en-US" sz="4400" spc="-1" strike="noStrike">
-                <a:solidFill>
-                  <a:srgbClr val="000000"/>
-                </a:solidFill>
-                <a:uFill>
-                  <a:solidFill>
-                    <a:srgbClr val="ffffff"/>
-                  </a:solidFill>
-                </a:uFill>
-                <a:latin typeface="Calibri"/>
-              </a:rPr>
-              <a:t> </a:t>
-            </a:r>
-            <a:r>
-              <a:rPr b="0" lang="en-US" sz="4400" spc="-1" strike="noStrike">
-                <a:solidFill>
-                  <a:srgbClr val="000000"/>
-                </a:solidFill>
-                <a:uFill>
-                  <a:solidFill>
-                    <a:srgbClr val="ffffff"/>
-                  </a:solidFill>
-                </a:uFill>
-                <a:latin typeface="Calibri"/>
-              </a:rPr>
-              <a:t>t</a:t>
-            </a:r>
-            <a:r>
-              <a:rPr b="0" lang="en-US" sz="4400" spc="-1" strike="noStrike">
-                <a:solidFill>
-                  <a:srgbClr val="000000"/>
-                </a:solidFill>
-                <a:uFill>
-                  <a:solidFill>
-                    <a:srgbClr val="ffffff"/>
-                  </a:solidFill>
-                </a:uFill>
-                <a:latin typeface="Calibri"/>
-              </a:rPr>
-              <a:t>o</a:t>
-            </a:r>
-            <a:r>
-              <a:rPr b="0" lang="en-US" sz="4400" spc="-1" strike="noStrike">
-                <a:solidFill>
-                  <a:srgbClr val="000000"/>
-                </a:solidFill>
-                <a:uFill>
-                  <a:solidFill>
-                    <a:srgbClr val="ffffff"/>
-                  </a:solidFill>
-                </a:uFill>
-                <a:latin typeface="Calibri"/>
-              </a:rPr>
-              <a:t> </a:t>
-            </a:r>
-            <a:r>
-              <a:rPr b="0" lang="en-US" sz="4400" spc="-1" strike="noStrike">
-                <a:solidFill>
-                  <a:srgbClr val="000000"/>
-                </a:solidFill>
-                <a:uFill>
-                  <a:solidFill>
-                    <a:srgbClr val="ffffff"/>
-                  </a:solidFill>
-                </a:uFill>
-                <a:latin typeface="Calibri"/>
-              </a:rPr>
-              <a:t>e</a:t>
-            </a:r>
-            <a:r>
-              <a:rPr b="0" lang="en-US" sz="4400" spc="-1" strike="noStrike">
-                <a:solidFill>
-                  <a:srgbClr val="000000"/>
-                </a:solidFill>
-                <a:uFill>
-                  <a:solidFill>
-                    <a:srgbClr val="ffffff"/>
-                  </a:solidFill>
-                </a:uFill>
-                <a:latin typeface="Calibri"/>
-              </a:rPr>
-              <a:t>d</a:t>
-            </a:r>
-            <a:r>
-              <a:rPr b="0" lang="en-US" sz="4400" spc="-1" strike="noStrike">
-                <a:solidFill>
-                  <a:srgbClr val="000000"/>
-                </a:solidFill>
-                <a:uFill>
-                  <a:solidFill>
-                    <a:srgbClr val="ffffff"/>
-                  </a:solidFill>
-                </a:uFill>
-                <a:latin typeface="Calibri"/>
-              </a:rPr>
-              <a:t>i</a:t>
-            </a:r>
-            <a:r>
-              <a:rPr b="0" lang="en-US" sz="4400" spc="-1" strike="noStrike">
-                <a:solidFill>
-                  <a:srgbClr val="000000"/>
-                </a:solidFill>
-                <a:uFill>
-                  <a:solidFill>
-                    <a:srgbClr val="ffffff"/>
-                  </a:solidFill>
-                </a:uFill>
-                <a:latin typeface="Calibri"/>
-              </a:rPr>
-              <a:t>t</a:t>
-            </a:r>
-            <a:r>
-              <a:rPr b="0" lang="en-US" sz="4400" spc="-1" strike="noStrike">
-                <a:solidFill>
-                  <a:srgbClr val="000000"/>
-                </a:solidFill>
-                <a:uFill>
-                  <a:solidFill>
-                    <a:srgbClr val="ffffff"/>
-                  </a:solidFill>
-                </a:uFill>
-                <a:latin typeface="Calibri"/>
-              </a:rPr>
-              <a:t> </a:t>
-            </a:r>
-            <a:r>
-              <a:rPr b="0" lang="en-US" sz="4400" spc="-1" strike="noStrike">
-                <a:solidFill>
-                  <a:srgbClr val="000000"/>
-                </a:solidFill>
-                <a:uFill>
-                  <a:solidFill>
-                    <a:srgbClr val="ffffff"/>
-                  </a:solidFill>
-                </a:uFill>
-                <a:latin typeface="Calibri"/>
-              </a:rPr>
-              <a:t>M</a:t>
-            </a:r>
-            <a:r>
-              <a:rPr b="0" lang="en-US" sz="4400" spc="-1" strike="noStrike">
-                <a:solidFill>
-                  <a:srgbClr val="000000"/>
-                </a:solidFill>
-                <a:uFill>
-                  <a:solidFill>
-                    <a:srgbClr val="ffffff"/>
-                  </a:solidFill>
-                </a:uFill>
-                <a:latin typeface="Calibri"/>
-              </a:rPr>
-              <a:t>a</a:t>
-            </a:r>
-            <a:r>
-              <a:rPr b="0" lang="en-US" sz="4400" spc="-1" strike="noStrike">
-                <a:solidFill>
-                  <a:srgbClr val="000000"/>
-                </a:solidFill>
-                <a:uFill>
-                  <a:solidFill>
-                    <a:srgbClr val="ffffff"/>
-                  </a:solidFill>
-                </a:uFill>
-                <a:latin typeface="Calibri"/>
-              </a:rPr>
-              <a:t>s</a:t>
-            </a:r>
-            <a:r>
-              <a:rPr b="0" lang="en-US" sz="4400" spc="-1" strike="noStrike">
-                <a:solidFill>
-                  <a:srgbClr val="000000"/>
-                </a:solidFill>
-                <a:uFill>
-                  <a:solidFill>
-                    <a:srgbClr val="ffffff"/>
-                  </a:solidFill>
-                </a:uFill>
-                <a:latin typeface="Calibri"/>
-              </a:rPr>
-              <a:t>t</a:t>
-            </a:r>
-            <a:r>
-              <a:rPr b="0" lang="en-US" sz="4400" spc="-1" strike="noStrike">
-                <a:solidFill>
-                  <a:srgbClr val="000000"/>
-                </a:solidFill>
-                <a:uFill>
-                  <a:solidFill>
-                    <a:srgbClr val="ffffff"/>
-                  </a:solidFill>
-                </a:uFill>
-                <a:latin typeface="Calibri"/>
-              </a:rPr>
-              <a:t>e</a:t>
-            </a:r>
-            <a:r>
-              <a:rPr b="0" lang="en-US" sz="4400" spc="-1" strike="noStrike">
-                <a:solidFill>
-                  <a:srgbClr val="000000"/>
-                </a:solidFill>
-                <a:uFill>
-                  <a:solidFill>
-                    <a:srgbClr val="ffffff"/>
-                  </a:solidFill>
-                </a:uFill>
-                <a:latin typeface="Calibri"/>
-              </a:rPr>
-              <a:t>r</a:t>
-            </a:r>
-            <a:r>
-              <a:rPr b="0" lang="en-US" sz="4400" spc="-1" strike="noStrike">
-                <a:solidFill>
-                  <a:srgbClr val="000000"/>
-                </a:solidFill>
-                <a:uFill>
-                  <a:solidFill>
-                    <a:srgbClr val="ffffff"/>
-                  </a:solidFill>
-                </a:uFill>
-                <a:latin typeface="Calibri"/>
-              </a:rPr>
-              <a:t> </a:t>
-            </a:r>
-            <a:r>
-              <a:rPr b="0" lang="en-US" sz="4400" spc="-1" strike="noStrike">
-                <a:solidFill>
-                  <a:srgbClr val="000000"/>
-                </a:solidFill>
-                <a:uFill>
-                  <a:solidFill>
-                    <a:srgbClr val="ffffff"/>
-                  </a:solidFill>
-                </a:uFill>
-                <a:latin typeface="Calibri"/>
-              </a:rPr>
-              <a:t>t</a:t>
-            </a:r>
-            <a:r>
-              <a:rPr b="0" lang="en-US" sz="4400" spc="-1" strike="noStrike">
-                <a:solidFill>
-                  <a:srgbClr val="000000"/>
-                </a:solidFill>
-                <a:uFill>
-                  <a:solidFill>
-                    <a:srgbClr val="ffffff"/>
-                  </a:solidFill>
-                </a:uFill>
-                <a:latin typeface="Calibri"/>
-              </a:rPr>
-              <a:t>i</a:t>
-            </a:r>
-            <a:r>
-              <a:rPr b="0" lang="en-US" sz="4400" spc="-1" strike="noStrike">
-                <a:solidFill>
-                  <a:srgbClr val="000000"/>
-                </a:solidFill>
-                <a:uFill>
-                  <a:solidFill>
-                    <a:srgbClr val="ffffff"/>
-                  </a:solidFill>
-                </a:uFill>
-                <a:latin typeface="Calibri"/>
-              </a:rPr>
-              <a:t>t</a:t>
-            </a:r>
-            <a:r>
-              <a:rPr b="0" lang="en-US" sz="4400" spc="-1" strike="noStrike">
-                <a:solidFill>
-                  <a:srgbClr val="000000"/>
-                </a:solidFill>
-                <a:uFill>
-                  <a:solidFill>
-                    <a:srgbClr val="ffffff"/>
-                  </a:solidFill>
-                </a:uFill>
-                <a:latin typeface="Calibri"/>
-              </a:rPr>
-              <a:t>l</a:t>
-            </a:r>
-            <a:r>
-              <a:rPr b="0" lang="en-US" sz="4400" spc="-1" strike="noStrike">
-                <a:solidFill>
-                  <a:srgbClr val="000000"/>
-                </a:solidFill>
-                <a:uFill>
-                  <a:solidFill>
-                    <a:srgbClr val="ffffff"/>
-                  </a:solidFill>
-                </a:uFill>
-                <a:latin typeface="Calibri"/>
-              </a:rPr>
-              <a:t>e</a:t>
-            </a:r>
-            <a:r>
-              <a:rPr b="0" lang="en-US" sz="4400" spc="-1" strike="noStrike">
-                <a:solidFill>
-                  <a:srgbClr val="000000"/>
-                </a:solidFill>
-                <a:uFill>
-                  <a:solidFill>
-                    <a:srgbClr val="ffffff"/>
-                  </a:solidFill>
-                </a:uFill>
-                <a:latin typeface="Calibri"/>
-              </a:rPr>
-              <a:t> </a:t>
-            </a:r>
-            <a:r>
-              <a:rPr b="0" lang="en-US" sz="4400" spc="-1" strike="noStrike">
-                <a:solidFill>
-                  <a:srgbClr val="000000"/>
-                </a:solidFill>
-                <a:uFill>
-                  <a:solidFill>
-                    <a:srgbClr val="ffffff"/>
-                  </a:solidFill>
-                </a:uFill>
-                <a:latin typeface="Calibri"/>
-              </a:rPr>
-              <a:t>s</a:t>
-            </a:r>
-            <a:r>
-              <a:rPr b="0" lang="en-US" sz="4400" spc="-1" strike="noStrike">
-                <a:solidFill>
-                  <a:srgbClr val="000000"/>
-                </a:solidFill>
-                <a:uFill>
-                  <a:solidFill>
-                    <a:srgbClr val="ffffff"/>
-                  </a:solidFill>
-                </a:uFill>
-                <a:latin typeface="Calibri"/>
-              </a:rPr>
-              <a:t>t</a:t>
-            </a:r>
-            <a:r>
-              <a:rPr b="0" lang="en-US" sz="4400" spc="-1" strike="noStrike">
-                <a:solidFill>
-                  <a:srgbClr val="000000"/>
-                </a:solidFill>
-                <a:uFill>
-                  <a:solidFill>
-                    <a:srgbClr val="ffffff"/>
-                  </a:solidFill>
-                </a:uFill>
-                <a:latin typeface="Calibri"/>
-              </a:rPr>
-              <a:t>y</a:t>
-            </a:r>
-            <a:r>
-              <a:rPr b="0" lang="en-US" sz="4400" spc="-1" strike="noStrike">
-                <a:solidFill>
-                  <a:srgbClr val="000000"/>
-                </a:solidFill>
-                <a:uFill>
-                  <a:solidFill>
-                    <a:srgbClr val="ffffff"/>
-                  </a:solidFill>
-                </a:uFill>
-                <a:latin typeface="Calibri"/>
-              </a:rPr>
-              <a:t>l</a:t>
-            </a:r>
-            <a:r>
-              <a:rPr b="0" lang="en-US" sz="4400" spc="-1" strike="noStrike">
-                <a:solidFill>
-                  <a:srgbClr val="000000"/>
-                </a:solidFill>
-                <a:uFill>
-                  <a:solidFill>
-                    <a:srgbClr val="ffffff"/>
-                  </a:solidFill>
-                </a:uFill>
-                <a:latin typeface="Calibri"/>
-              </a:rPr>
-              <a:t>e</a:t>
+              <a:t>Click to edit Master title style</a:t>
             </a:r>
             <a:endParaRPr b="0" lang="en-US" sz="4400" spc="-1" strike="noStrike">
               <a:solidFill>
@@ -2115,7 +1681,7 @@
                 <a:spcPct val="100000"/>
               </a:lnSpc>
             </a:pPr>
-            <a:fld id="{20163657-B87A-4663-95CF-B77FF28DE646}" type="datetime">
+            <a:fld id="{218DB86C-F6CB-4610-8757-308EC80E93B6}" type="datetime">
               <a:rPr b="0" lang="en-US" sz="1200" spc="-1" strike="noStrike">
                 <a:solidFill>
                   <a:srgbClr val="8b8b8b"/>
@@ -2206,7 +1772,7 @@
                 <a:spcPct val="100000"/>
               </a:lnSpc>
             </a:pPr>
-            <a:fld id="{BA1FB3E5-FACA-4F7F-9AD1-030F35E6F4D0}" type="slidenum">
+            <a:fld id="{78091A45-C3C8-45EC-803F-E91344BA9F83}" type="slidenum">
               <a:rPr b="0" lang="en-US" sz="1200" spc="-1" strike="noStrike">
                 <a:solidFill>
                   <a:srgbClr val="8b8b8b"/>
@@ -7245,8 +6811,8 @@
         </p:nvSpPr>
         <p:spPr>
           <a:xfrm>
-            <a:off x="6126480" y="2834640"/>
-            <a:ext cx="822960" cy="323640"/>
+            <a:off x="5669280" y="2834640"/>
+            <a:ext cx="1280160" cy="323640"/>
           </a:xfrm>
           <a:prstGeom prst="rightArrow">
             <a:avLst>
@@ -9428,7 +8994,7 @@
         <p:spPr>
           <a:xfrm>
             <a:off x="2011680" y="2834640"/>
-            <a:ext cx="822960" cy="323640"/>
+            <a:ext cx="1371600" cy="323640"/>
           </a:xfrm>
           <a:prstGeom prst="rightArrow">
             <a:avLst>

</xml_diff>